<commit_message>
some more slides stuff
</commit_message>
<xml_diff>
--- a/slides/figure/make_figs.pptx
+++ b/slides/figure/make_figs.pptx
@@ -6,6 +6,7 @@
   </p:sldMasterIdLst>
   <p:sldIdLst>
     <p:sldId id="256" r:id="rId2"/>
+    <p:sldId id="257" r:id="rId3"/>
   </p:sldIdLst>
   <p:sldSz cx="9144000" cy="6858000" type="screen4x3"/>
   <p:notesSz cx="6858000" cy="9144000"/>
@@ -288,7 +289,7 @@
           <a:p>
             <a:fld id="{844E8EA4-4312-9C48-A4C4-CC98878E32B3}" type="datetimeFigureOut">
               <a:rPr lang="en-US" smtClean="0"/>
-              <a:t>6/18/18</a:t>
+              <a:t>6/22/18</a:t>
             </a:fld>
             <a:endParaRPr lang="en-US"/>
           </a:p>
@@ -458,7 +459,7 @@
           <a:p>
             <a:fld id="{844E8EA4-4312-9C48-A4C4-CC98878E32B3}" type="datetimeFigureOut">
               <a:rPr lang="en-US" smtClean="0"/>
-              <a:t>6/18/18</a:t>
+              <a:t>6/22/18</a:t>
             </a:fld>
             <a:endParaRPr lang="en-US"/>
           </a:p>
@@ -638,7 +639,7 @@
           <a:p>
             <a:fld id="{844E8EA4-4312-9C48-A4C4-CC98878E32B3}" type="datetimeFigureOut">
               <a:rPr lang="en-US" smtClean="0"/>
-              <a:t>6/18/18</a:t>
+              <a:t>6/22/18</a:t>
             </a:fld>
             <a:endParaRPr lang="en-US"/>
           </a:p>
@@ -808,7 +809,7 @@
           <a:p>
             <a:fld id="{844E8EA4-4312-9C48-A4C4-CC98878E32B3}" type="datetimeFigureOut">
               <a:rPr lang="en-US" smtClean="0"/>
-              <a:t>6/18/18</a:t>
+              <a:t>6/22/18</a:t>
             </a:fld>
             <a:endParaRPr lang="en-US"/>
           </a:p>
@@ -1054,7 +1055,7 @@
           <a:p>
             <a:fld id="{844E8EA4-4312-9C48-A4C4-CC98878E32B3}" type="datetimeFigureOut">
               <a:rPr lang="en-US" smtClean="0"/>
-              <a:t>6/18/18</a:t>
+              <a:t>6/22/18</a:t>
             </a:fld>
             <a:endParaRPr lang="en-US"/>
           </a:p>
@@ -1342,7 +1343,7 @@
           <a:p>
             <a:fld id="{844E8EA4-4312-9C48-A4C4-CC98878E32B3}" type="datetimeFigureOut">
               <a:rPr lang="en-US" smtClean="0"/>
-              <a:t>6/18/18</a:t>
+              <a:t>6/22/18</a:t>
             </a:fld>
             <a:endParaRPr lang="en-US"/>
           </a:p>
@@ -1764,7 +1765,7 @@
           <a:p>
             <a:fld id="{844E8EA4-4312-9C48-A4C4-CC98878E32B3}" type="datetimeFigureOut">
               <a:rPr lang="en-US" smtClean="0"/>
-              <a:t>6/18/18</a:t>
+              <a:t>6/22/18</a:t>
             </a:fld>
             <a:endParaRPr lang="en-US"/>
           </a:p>
@@ -1882,7 +1883,7 @@
           <a:p>
             <a:fld id="{844E8EA4-4312-9C48-A4C4-CC98878E32B3}" type="datetimeFigureOut">
               <a:rPr lang="en-US" smtClean="0"/>
-              <a:t>6/18/18</a:t>
+              <a:t>6/22/18</a:t>
             </a:fld>
             <a:endParaRPr lang="en-US"/>
           </a:p>
@@ -1977,7 +1978,7 @@
           <a:p>
             <a:fld id="{844E8EA4-4312-9C48-A4C4-CC98878E32B3}" type="datetimeFigureOut">
               <a:rPr lang="en-US" smtClean="0"/>
-              <a:t>6/18/18</a:t>
+              <a:t>6/22/18</a:t>
             </a:fld>
             <a:endParaRPr lang="en-US"/>
           </a:p>
@@ -2254,7 +2255,7 @@
           <a:p>
             <a:fld id="{844E8EA4-4312-9C48-A4C4-CC98878E32B3}" type="datetimeFigureOut">
               <a:rPr lang="en-US" smtClean="0"/>
-              <a:t>6/18/18</a:t>
+              <a:t>6/22/18</a:t>
             </a:fld>
             <a:endParaRPr lang="en-US"/>
           </a:p>
@@ -2507,7 +2508,7 @@
           <a:p>
             <a:fld id="{844E8EA4-4312-9C48-A4C4-CC98878E32B3}" type="datetimeFigureOut">
               <a:rPr lang="en-US" smtClean="0"/>
-              <a:t>6/18/18</a:t>
+              <a:t>6/22/18</a:t>
             </a:fld>
             <a:endParaRPr lang="en-US"/>
           </a:p>
@@ -2720,7 +2721,7 @@
           <a:p>
             <a:fld id="{844E8EA4-4312-9C48-A4C4-CC98878E32B3}" type="datetimeFigureOut">
               <a:rPr lang="en-US" smtClean="0"/>
-              <a:t>6/18/18</a:t>
+              <a:t>6/22/18</a:t>
             </a:fld>
             <a:endParaRPr lang="en-US"/>
           </a:p>
@@ -3575,6 +3576,630 @@
     <p:extLst>
       <p:ext uri="{BB962C8B-B14F-4D97-AF65-F5344CB8AC3E}">
         <p14:creationId xmlns:p14="http://schemas.microsoft.com/office/powerpoint/2010/main" val="2891170607"/>
+      </p:ext>
+    </p:extLst>
+  </p:cSld>
+  <p:clrMapOvr>
+    <a:masterClrMapping/>
+  </p:clrMapOvr>
+</p:sld>
+</file>
+
+<file path=ppt/slides/slide2.xml><?xml version="1.0" encoding="utf-8"?>
+<p:sld xmlns:a="http://schemas.openxmlformats.org/drawingml/2006/main" xmlns:r="http://schemas.openxmlformats.org/officeDocument/2006/relationships" xmlns:p="http://schemas.openxmlformats.org/presentationml/2006/main">
+  <p:cSld>
+    <p:spTree>
+      <p:nvGrpSpPr>
+        <p:cNvPr id="1" name=""/>
+        <p:cNvGrpSpPr/>
+        <p:nvPr/>
+      </p:nvGrpSpPr>
+      <p:grpSpPr>
+        <a:xfrm>
+          <a:off x="0" y="0"/>
+          <a:ext cx="0" cy="0"/>
+          <a:chOff x="0" y="0"/>
+          <a:chExt cx="0" cy="0"/>
+        </a:xfrm>
+      </p:grpSpPr>
+      <p:sp>
+        <p:nvSpPr>
+          <p:cNvPr id="21" name="Rectangle 20"/>
+          <p:cNvSpPr/>
+          <p:nvPr/>
+        </p:nvSpPr>
+        <p:spPr>
+          <a:xfrm>
+            <a:off x="6927913" y="2976419"/>
+            <a:ext cx="854964" cy="855090"/>
+          </a:xfrm>
+          <a:prstGeom prst="rect">
+            <a:avLst/>
+          </a:prstGeom>
+          <a:solidFill>
+            <a:schemeClr val="accent3"/>
+          </a:solidFill>
+          <a:ln>
+            <a:noFill/>
+          </a:ln>
+          <a:effectLst/>
+        </p:spPr>
+        <p:style>
+          <a:lnRef idx="1">
+            <a:schemeClr val="accent1"/>
+          </a:lnRef>
+          <a:fillRef idx="3">
+            <a:schemeClr val="accent1"/>
+          </a:fillRef>
+          <a:effectRef idx="2">
+            <a:schemeClr val="accent1"/>
+          </a:effectRef>
+          <a:fontRef idx="minor">
+            <a:schemeClr val="lt1"/>
+          </a:fontRef>
+        </p:style>
+        <p:txBody>
+          <a:bodyPr rtlCol="0" anchor="ctr"/>
+          <a:lstStyle/>
+          <a:p>
+            <a:pPr algn="ctr"/>
+            <a:endParaRPr lang="en-US"/>
+          </a:p>
+        </p:txBody>
+      </p:sp>
+      <p:sp>
+        <p:nvSpPr>
+          <p:cNvPr id="22" name="Rectangle 21"/>
+          <p:cNvSpPr/>
+          <p:nvPr/>
+        </p:nvSpPr>
+        <p:spPr>
+          <a:xfrm>
+            <a:off x="6072949" y="2976668"/>
+            <a:ext cx="854964" cy="855090"/>
+          </a:xfrm>
+          <a:prstGeom prst="rect">
+            <a:avLst/>
+          </a:prstGeom>
+          <a:solidFill>
+            <a:schemeClr val="accent1"/>
+          </a:solidFill>
+          <a:ln>
+            <a:noFill/>
+          </a:ln>
+          <a:effectLst/>
+        </p:spPr>
+        <p:style>
+          <a:lnRef idx="1">
+            <a:schemeClr val="accent1"/>
+          </a:lnRef>
+          <a:fillRef idx="3">
+            <a:schemeClr val="accent1"/>
+          </a:fillRef>
+          <a:effectRef idx="2">
+            <a:schemeClr val="accent1"/>
+          </a:effectRef>
+          <a:fontRef idx="minor">
+            <a:schemeClr val="lt1"/>
+          </a:fontRef>
+        </p:style>
+        <p:txBody>
+          <a:bodyPr rtlCol="0" anchor="ctr"/>
+          <a:lstStyle/>
+          <a:p>
+            <a:pPr algn="ctr"/>
+            <a:endParaRPr lang="en-US"/>
+          </a:p>
+        </p:txBody>
+      </p:sp>
+      <p:sp>
+        <p:nvSpPr>
+          <p:cNvPr id="23" name="Rectangle 22"/>
+          <p:cNvSpPr/>
+          <p:nvPr/>
+        </p:nvSpPr>
+        <p:spPr>
+          <a:xfrm>
+            <a:off x="6072950" y="3831258"/>
+            <a:ext cx="854964" cy="855090"/>
+          </a:xfrm>
+          <a:prstGeom prst="rect">
+            <a:avLst/>
+          </a:prstGeom>
+          <a:solidFill>
+            <a:schemeClr val="accent4"/>
+          </a:solidFill>
+          <a:ln>
+            <a:noFill/>
+          </a:ln>
+          <a:effectLst/>
+        </p:spPr>
+        <p:style>
+          <a:lnRef idx="1">
+            <a:schemeClr val="accent1"/>
+          </a:lnRef>
+          <a:fillRef idx="3">
+            <a:schemeClr val="accent1"/>
+          </a:fillRef>
+          <a:effectRef idx="2">
+            <a:schemeClr val="accent1"/>
+          </a:effectRef>
+          <a:fontRef idx="minor">
+            <a:schemeClr val="lt1"/>
+          </a:fontRef>
+        </p:style>
+        <p:txBody>
+          <a:bodyPr rtlCol="0" anchor="ctr"/>
+          <a:lstStyle/>
+          <a:p>
+            <a:pPr algn="ctr"/>
+            <a:endParaRPr lang="en-US"/>
+          </a:p>
+        </p:txBody>
+      </p:sp>
+      <p:sp>
+        <p:nvSpPr>
+          <p:cNvPr id="24" name="Rectangle 23"/>
+          <p:cNvSpPr/>
+          <p:nvPr/>
+        </p:nvSpPr>
+        <p:spPr>
+          <a:xfrm>
+            <a:off x="6927913" y="3831258"/>
+            <a:ext cx="854964" cy="855090"/>
+          </a:xfrm>
+          <a:prstGeom prst="rect">
+            <a:avLst/>
+          </a:prstGeom>
+          <a:solidFill>
+            <a:schemeClr val="accent2"/>
+          </a:solidFill>
+          <a:ln>
+            <a:noFill/>
+          </a:ln>
+          <a:effectLst/>
+        </p:spPr>
+        <p:style>
+          <a:lnRef idx="1">
+            <a:schemeClr val="accent1"/>
+          </a:lnRef>
+          <a:fillRef idx="3">
+            <a:schemeClr val="accent1"/>
+          </a:fillRef>
+          <a:effectRef idx="2">
+            <a:schemeClr val="accent1"/>
+          </a:effectRef>
+          <a:fontRef idx="minor">
+            <a:schemeClr val="lt1"/>
+          </a:fontRef>
+        </p:style>
+        <p:txBody>
+          <a:bodyPr rtlCol="0" anchor="ctr"/>
+          <a:lstStyle/>
+          <a:p>
+            <a:pPr algn="ctr"/>
+            <a:endParaRPr lang="en-US"/>
+          </a:p>
+        </p:txBody>
+      </p:sp>
+      <p:grpSp>
+        <p:nvGrpSpPr>
+          <p:cNvPr id="20" name="Group 19"/>
+          <p:cNvGrpSpPr/>
+          <p:nvPr/>
+        </p:nvGrpSpPr>
+        <p:grpSpPr>
+          <a:xfrm>
+            <a:off x="5309905" y="2263611"/>
+            <a:ext cx="2472973" cy="2422986"/>
+            <a:chOff x="745763" y="456651"/>
+            <a:chExt cx="2472973" cy="2422986"/>
+          </a:xfrm>
+        </p:grpSpPr>
+        <p:sp>
+          <p:nvSpPr>
+            <p:cNvPr id="4" name="Rectangle 3"/>
+            <p:cNvSpPr/>
+            <p:nvPr/>
+          </p:nvSpPr>
+          <p:spPr>
+            <a:xfrm>
+              <a:off x="1508807" y="1169460"/>
+              <a:ext cx="1709928" cy="1710177"/>
+            </a:xfrm>
+            <a:prstGeom prst="rect">
+              <a:avLst/>
+            </a:prstGeom>
+            <a:noFill/>
+            <a:ln>
+              <a:solidFill>
+                <a:schemeClr val="tx1"/>
+              </a:solidFill>
+            </a:ln>
+            <a:effectLst/>
+          </p:spPr>
+          <p:style>
+            <a:lnRef idx="1">
+              <a:schemeClr val="accent1"/>
+            </a:lnRef>
+            <a:fillRef idx="3">
+              <a:schemeClr val="accent1"/>
+            </a:fillRef>
+            <a:effectRef idx="2">
+              <a:schemeClr val="accent1"/>
+            </a:effectRef>
+            <a:fontRef idx="minor">
+              <a:schemeClr val="lt1"/>
+            </a:fontRef>
+          </p:style>
+          <p:txBody>
+            <a:bodyPr rtlCol="0" anchor="ctr"/>
+            <a:lstStyle/>
+            <a:p>
+              <a:pPr algn="ctr"/>
+              <a:endParaRPr lang="en-US"/>
+            </a:p>
+          </p:txBody>
+        </p:sp>
+        <p:cxnSp>
+          <p:nvCxnSpPr>
+            <p:cNvPr id="6" name="Straight Connector 5"/>
+            <p:cNvCxnSpPr>
+              <a:stCxn id="4" idx="0"/>
+              <a:endCxn id="4" idx="2"/>
+            </p:cNvCxnSpPr>
+            <p:nvPr/>
+          </p:nvCxnSpPr>
+          <p:spPr>
+            <a:xfrm>
+              <a:off x="2363771" y="1169460"/>
+              <a:ext cx="0" cy="1710177"/>
+            </a:xfrm>
+            <a:prstGeom prst="line">
+              <a:avLst/>
+            </a:prstGeom>
+            <a:ln>
+              <a:solidFill>
+                <a:schemeClr val="tx1"/>
+              </a:solidFill>
+            </a:ln>
+            <a:effectLst/>
+          </p:spPr>
+          <p:style>
+            <a:lnRef idx="2">
+              <a:schemeClr val="accent1"/>
+            </a:lnRef>
+            <a:fillRef idx="0">
+              <a:schemeClr val="accent1"/>
+            </a:fillRef>
+            <a:effectRef idx="1">
+              <a:schemeClr val="accent1"/>
+            </a:effectRef>
+            <a:fontRef idx="minor">
+              <a:schemeClr val="tx1"/>
+            </a:fontRef>
+          </p:style>
+        </p:cxnSp>
+        <p:cxnSp>
+          <p:nvCxnSpPr>
+            <p:cNvPr id="7" name="Straight Connector 6"/>
+            <p:cNvCxnSpPr>
+              <a:stCxn id="4" idx="1"/>
+              <a:endCxn id="4" idx="3"/>
+            </p:cNvCxnSpPr>
+            <p:nvPr/>
+          </p:nvCxnSpPr>
+          <p:spPr>
+            <a:xfrm>
+              <a:off x="1508807" y="2024549"/>
+              <a:ext cx="1709928" cy="0"/>
+            </a:xfrm>
+            <a:prstGeom prst="line">
+              <a:avLst/>
+            </a:prstGeom>
+            <a:ln>
+              <a:solidFill>
+                <a:schemeClr val="tx1"/>
+              </a:solidFill>
+            </a:ln>
+            <a:effectLst/>
+          </p:spPr>
+          <p:style>
+            <a:lnRef idx="2">
+              <a:schemeClr val="accent1"/>
+            </a:lnRef>
+            <a:fillRef idx="0">
+              <a:schemeClr val="accent1"/>
+            </a:fillRef>
+            <a:effectRef idx="1">
+              <a:schemeClr val="accent1"/>
+            </a:effectRef>
+            <a:fontRef idx="minor">
+              <a:schemeClr val="tx1"/>
+            </a:fontRef>
+          </p:style>
+        </p:cxnSp>
+        <p:sp>
+          <p:nvSpPr>
+            <p:cNvPr id="12" name="TextBox 11"/>
+            <p:cNvSpPr txBox="1"/>
+            <p:nvPr/>
+          </p:nvSpPr>
+          <p:spPr>
+            <a:xfrm>
+              <a:off x="1508807" y="456651"/>
+              <a:ext cx="1709928" cy="369332"/>
+            </a:xfrm>
+            <a:prstGeom prst="rect">
+              <a:avLst/>
+            </a:prstGeom>
+            <a:noFill/>
+          </p:spPr>
+          <p:txBody>
+            <a:bodyPr wrap="square" rtlCol="0">
+              <a:spAutoFit/>
+            </a:bodyPr>
+            <a:lstStyle/>
+            <a:p>
+              <a:r>
+                <a:rPr lang="en-US" dirty="0" smtClean="0">
+                  <a:latin typeface="Times New Roman"/>
+                  <a:cs typeface="Times New Roman"/>
+                </a:rPr>
+                <a:t>List 2</a:t>
+              </a:r>
+              <a:endParaRPr lang="en-US" dirty="0">
+                <a:latin typeface="Times New Roman"/>
+                <a:cs typeface="Times New Roman"/>
+              </a:endParaRPr>
+            </a:p>
+          </p:txBody>
+        </p:sp>
+        <p:sp>
+          <p:nvSpPr>
+            <p:cNvPr id="13" name="TextBox 12"/>
+            <p:cNvSpPr txBox="1"/>
+            <p:nvPr/>
+          </p:nvSpPr>
+          <p:spPr>
+            <a:xfrm rot="16200000">
+              <a:off x="75465" y="1840007"/>
+              <a:ext cx="1709928" cy="369332"/>
+            </a:xfrm>
+            <a:prstGeom prst="rect">
+              <a:avLst/>
+            </a:prstGeom>
+            <a:noFill/>
+          </p:spPr>
+          <p:txBody>
+            <a:bodyPr wrap="square" rtlCol="0">
+              <a:spAutoFit/>
+            </a:bodyPr>
+            <a:lstStyle/>
+            <a:p>
+              <a:r>
+                <a:rPr lang="en-US" dirty="0" smtClean="0">
+                  <a:latin typeface="Times New Roman"/>
+                  <a:cs typeface="Times New Roman"/>
+                </a:rPr>
+                <a:t>List 1</a:t>
+              </a:r>
+              <a:endParaRPr lang="en-US" dirty="0">
+                <a:latin typeface="Times New Roman"/>
+                <a:cs typeface="Times New Roman"/>
+              </a:endParaRPr>
+            </a:p>
+          </p:txBody>
+        </p:sp>
+        <p:sp>
+          <p:nvSpPr>
+            <p:cNvPr id="14" name="TextBox 13"/>
+            <p:cNvSpPr txBox="1"/>
+            <p:nvPr/>
+          </p:nvSpPr>
+          <p:spPr>
+            <a:xfrm rot="16200000">
+              <a:off x="469177" y="1839758"/>
+              <a:ext cx="1709928" cy="369332"/>
+            </a:xfrm>
+            <a:prstGeom prst="rect">
+              <a:avLst/>
+            </a:prstGeom>
+            <a:noFill/>
+          </p:spPr>
+          <p:txBody>
+            <a:bodyPr wrap="square" rtlCol="0">
+              <a:spAutoFit/>
+            </a:bodyPr>
+            <a:lstStyle/>
+            <a:p>
+              <a:r>
+                <a:rPr lang="en-US" dirty="0" smtClean="0">
+                  <a:latin typeface="Times New Roman"/>
+                  <a:cs typeface="Times New Roman"/>
+                </a:rPr>
+                <a:t>Yes          No</a:t>
+              </a:r>
+              <a:endParaRPr lang="en-US" dirty="0">
+                <a:latin typeface="Times New Roman"/>
+                <a:cs typeface="Times New Roman"/>
+              </a:endParaRPr>
+            </a:p>
+          </p:txBody>
+        </p:sp>
+        <p:sp>
+          <p:nvSpPr>
+            <p:cNvPr id="15" name="TextBox 14"/>
+            <p:cNvSpPr txBox="1"/>
+            <p:nvPr/>
+          </p:nvSpPr>
+          <p:spPr>
+            <a:xfrm>
+              <a:off x="1508808" y="813409"/>
+              <a:ext cx="1709928" cy="369332"/>
+            </a:xfrm>
+            <a:prstGeom prst="rect">
+              <a:avLst/>
+            </a:prstGeom>
+            <a:noFill/>
+          </p:spPr>
+          <p:txBody>
+            <a:bodyPr wrap="square" rtlCol="0">
+              <a:spAutoFit/>
+            </a:bodyPr>
+            <a:lstStyle/>
+            <a:p>
+              <a:r>
+                <a:rPr lang="en-US" dirty="0" smtClean="0">
+                  <a:latin typeface="Times New Roman"/>
+                  <a:cs typeface="Times New Roman"/>
+                </a:rPr>
+                <a:t>Yes          No</a:t>
+              </a:r>
+              <a:endParaRPr lang="en-US" dirty="0">
+                <a:latin typeface="Times New Roman"/>
+                <a:cs typeface="Times New Roman"/>
+              </a:endParaRPr>
+            </a:p>
+          </p:txBody>
+        </p:sp>
+        <p:sp>
+          <p:nvSpPr>
+            <p:cNvPr id="16" name="TextBox 15"/>
+            <p:cNvSpPr txBox="1"/>
+            <p:nvPr/>
+          </p:nvSpPr>
+          <p:spPr>
+            <a:xfrm>
+              <a:off x="2602663" y="1405838"/>
+              <a:ext cx="414949" cy="369332"/>
+            </a:xfrm>
+            <a:prstGeom prst="rect">
+              <a:avLst/>
+            </a:prstGeom>
+            <a:noFill/>
+          </p:spPr>
+          <p:txBody>
+            <a:bodyPr wrap="square" rtlCol="0">
+              <a:spAutoFit/>
+            </a:bodyPr>
+            <a:lstStyle/>
+            <a:p>
+              <a:r>
+                <a:rPr lang="en-US" dirty="0" smtClean="0">
+                  <a:latin typeface="Times New Roman"/>
+                  <a:cs typeface="Times New Roman"/>
+                </a:rPr>
+                <a:t>??</a:t>
+              </a:r>
+              <a:endParaRPr lang="en-US" dirty="0">
+                <a:latin typeface="Times New Roman"/>
+                <a:cs typeface="Times New Roman"/>
+              </a:endParaRPr>
+            </a:p>
+          </p:txBody>
+        </p:sp>
+        <p:sp>
+          <p:nvSpPr>
+            <p:cNvPr id="17" name="TextBox 16"/>
+            <p:cNvSpPr txBox="1"/>
+            <p:nvPr/>
+          </p:nvSpPr>
+          <p:spPr>
+            <a:xfrm>
+              <a:off x="2653715" y="2241005"/>
+              <a:ext cx="312845" cy="369332"/>
+            </a:xfrm>
+            <a:prstGeom prst="rect">
+              <a:avLst/>
+            </a:prstGeom>
+            <a:noFill/>
+          </p:spPr>
+          <p:txBody>
+            <a:bodyPr wrap="square" rtlCol="0">
+              <a:spAutoFit/>
+            </a:bodyPr>
+            <a:lstStyle/>
+            <a:p>
+              <a:r>
+                <a:rPr lang="en-US" dirty="0">
+                  <a:latin typeface="Times New Roman"/>
+                  <a:cs typeface="Times New Roman"/>
+                </a:rPr>
+                <a:t>1</a:t>
+              </a:r>
+            </a:p>
+          </p:txBody>
+        </p:sp>
+        <p:sp>
+          <p:nvSpPr>
+            <p:cNvPr id="18" name="TextBox 17"/>
+            <p:cNvSpPr txBox="1"/>
+            <p:nvPr/>
+          </p:nvSpPr>
+          <p:spPr>
+            <a:xfrm>
+              <a:off x="1788427" y="2241005"/>
+              <a:ext cx="312845" cy="369332"/>
+            </a:xfrm>
+            <a:prstGeom prst="rect">
+              <a:avLst/>
+            </a:prstGeom>
+            <a:noFill/>
+          </p:spPr>
+          <p:txBody>
+            <a:bodyPr wrap="square" rtlCol="0">
+              <a:spAutoFit/>
+            </a:bodyPr>
+            <a:lstStyle/>
+            <a:p>
+              <a:r>
+                <a:rPr lang="en-US" dirty="0">
+                  <a:latin typeface="Times New Roman"/>
+                  <a:cs typeface="Times New Roman"/>
+                </a:rPr>
+                <a:t>1</a:t>
+              </a:r>
+            </a:p>
+          </p:txBody>
+        </p:sp>
+        <p:sp>
+          <p:nvSpPr>
+            <p:cNvPr id="19" name="TextBox 18"/>
+            <p:cNvSpPr txBox="1"/>
+            <p:nvPr/>
+          </p:nvSpPr>
+          <p:spPr>
+            <a:xfrm>
+              <a:off x="1788427" y="1405838"/>
+              <a:ext cx="312845" cy="369332"/>
+            </a:xfrm>
+            <a:prstGeom prst="rect">
+              <a:avLst/>
+            </a:prstGeom>
+            <a:noFill/>
+          </p:spPr>
+          <p:txBody>
+            <a:bodyPr wrap="square" rtlCol="0">
+              <a:spAutoFit/>
+            </a:bodyPr>
+            <a:lstStyle/>
+            <a:p>
+              <a:r>
+                <a:rPr lang="en-US" dirty="0">
+                  <a:latin typeface="Times New Roman"/>
+                  <a:cs typeface="Times New Roman"/>
+                </a:rPr>
+                <a:t>1</a:t>
+              </a:r>
+            </a:p>
+          </p:txBody>
+        </p:sp>
+      </p:grpSp>
+    </p:spTree>
+    <p:extLst>
+      <p:ext uri="{BB962C8B-B14F-4D97-AF65-F5344CB8AC3E}">
+        <p14:creationId xmlns:p14="http://schemas.microsoft.com/office/powerpoint/2010/main" val="371076469"/>
       </p:ext>
     </p:extLst>
   </p:cSld>

</xml_diff>